<commit_message>
update pptx for RTM
</commit_message>
<xml_diff>
--- a/docs/talks/gRPC nologo.pptx
+++ b/docs/talks/gRPC nologo.pptx
@@ -232,7 +232,7 @@
           <a:p>
             <a:fld id="{C15D8BBE-15F5-4B28-B2DB-1CC350310DBA}" type="datetimeFigureOut">
               <a:rPr lang="en-GB" smtClean="0"/>
-              <a:t>04/09/2019</a:t>
+              <a:t>24/09/2019</a:t>
             </a:fld>
             <a:endParaRPr lang="en-GB"/>
           </a:p>
@@ -3632,7 +3632,7 @@
           <a:p>
             <a:fld id="{7D3DA4C0-E82A-4F47-8DE6-FC39AE56731A}" type="datetimeFigureOut">
               <a:rPr lang="en-GB" smtClean="0"/>
-              <a:t>04/09/2019</a:t>
+              <a:t>24/09/2019</a:t>
             </a:fld>
             <a:endParaRPr lang="en-GB"/>
           </a:p>
@@ -3832,7 +3832,7 @@
           <a:p>
             <a:fld id="{7D3DA4C0-E82A-4F47-8DE6-FC39AE56731A}" type="datetimeFigureOut">
               <a:rPr lang="en-GB" smtClean="0"/>
-              <a:t>04/09/2019</a:t>
+              <a:t>24/09/2019</a:t>
             </a:fld>
             <a:endParaRPr lang="en-GB"/>
           </a:p>
@@ -4042,7 +4042,7 @@
           <a:p>
             <a:fld id="{7D3DA4C0-E82A-4F47-8DE6-FC39AE56731A}" type="datetimeFigureOut">
               <a:rPr lang="en-GB" smtClean="0"/>
-              <a:t>04/09/2019</a:t>
+              <a:t>24/09/2019</a:t>
             </a:fld>
             <a:endParaRPr lang="en-GB"/>
           </a:p>
@@ -4242,7 +4242,7 @@
           <a:p>
             <a:fld id="{7D3DA4C0-E82A-4F47-8DE6-FC39AE56731A}" type="datetimeFigureOut">
               <a:rPr lang="en-GB" smtClean="0"/>
-              <a:t>04/09/2019</a:t>
+              <a:t>24/09/2019</a:t>
             </a:fld>
             <a:endParaRPr lang="en-GB"/>
           </a:p>
@@ -4518,7 +4518,7 @@
           <a:p>
             <a:fld id="{7D3DA4C0-E82A-4F47-8DE6-FC39AE56731A}" type="datetimeFigureOut">
               <a:rPr lang="en-GB" smtClean="0"/>
-              <a:t>04/09/2019</a:t>
+              <a:t>24/09/2019</a:t>
             </a:fld>
             <a:endParaRPr lang="en-GB"/>
           </a:p>
@@ -4786,7 +4786,7 @@
           <a:p>
             <a:fld id="{7D3DA4C0-E82A-4F47-8DE6-FC39AE56731A}" type="datetimeFigureOut">
               <a:rPr lang="en-GB" smtClean="0"/>
-              <a:t>04/09/2019</a:t>
+              <a:t>24/09/2019</a:t>
             </a:fld>
             <a:endParaRPr lang="en-GB"/>
           </a:p>
@@ -5201,7 +5201,7 @@
           <a:p>
             <a:fld id="{7D3DA4C0-E82A-4F47-8DE6-FC39AE56731A}" type="datetimeFigureOut">
               <a:rPr lang="en-GB" smtClean="0"/>
-              <a:t>04/09/2019</a:t>
+              <a:t>24/09/2019</a:t>
             </a:fld>
             <a:endParaRPr lang="en-GB"/>
           </a:p>
@@ -5343,7 +5343,7 @@
           <a:p>
             <a:fld id="{7D3DA4C0-E82A-4F47-8DE6-FC39AE56731A}" type="datetimeFigureOut">
               <a:rPr lang="en-GB" smtClean="0"/>
-              <a:t>04/09/2019</a:t>
+              <a:t>24/09/2019</a:t>
             </a:fld>
             <a:endParaRPr lang="en-GB"/>
           </a:p>
@@ -5456,7 +5456,7 @@
           <a:p>
             <a:fld id="{7D3DA4C0-E82A-4F47-8DE6-FC39AE56731A}" type="datetimeFigureOut">
               <a:rPr lang="en-GB" smtClean="0"/>
-              <a:t>04/09/2019</a:t>
+              <a:t>24/09/2019</a:t>
             </a:fld>
             <a:endParaRPr lang="en-GB"/>
           </a:p>
@@ -5769,7 +5769,7 @@
           <a:p>
             <a:fld id="{7D3DA4C0-E82A-4F47-8DE6-FC39AE56731A}" type="datetimeFigureOut">
               <a:rPr lang="en-GB" smtClean="0"/>
-              <a:t>04/09/2019</a:t>
+              <a:t>24/09/2019</a:t>
             </a:fld>
             <a:endParaRPr lang="en-GB"/>
           </a:p>
@@ -6058,7 +6058,7 @@
           <a:p>
             <a:fld id="{7D3DA4C0-E82A-4F47-8DE6-FC39AE56731A}" type="datetimeFigureOut">
               <a:rPr lang="en-GB" smtClean="0"/>
-              <a:t>04/09/2019</a:t>
+              <a:t>24/09/2019</a:t>
             </a:fld>
             <a:endParaRPr lang="en-GB"/>
           </a:p>
@@ -6301,7 +6301,7 @@
           <a:p>
             <a:fld id="{7D3DA4C0-E82A-4F47-8DE6-FC39AE56731A}" type="datetimeFigureOut">
               <a:rPr lang="en-GB" smtClean="0"/>
-              <a:t>04/09/2019</a:t>
+              <a:t>24/09/2019</a:t>
             </a:fld>
             <a:endParaRPr lang="en-GB"/>
           </a:p>
@@ -16950,7 +16950,7 @@
           <a:p>
             <a:r>
               <a:rPr lang="en-US" dirty="0"/>
-              <a:t>With .NET Core 3, Microsoft are fixing half of the problems…</a:t>
+              <a:t>With .NET Core 3, Microsoft have fixed half of the wrinkles…</a:t>
             </a:r>
           </a:p>
           <a:p>
@@ -16993,7 +16993,15 @@
           <a:p>
             <a:r>
               <a:rPr lang="en-US" dirty="0"/>
-              <a:t>Mostly pre-preview – “here be dragons”; maybe wait for preview7?</a:t>
+              <a:t>Google </a:t>
+            </a:r>
+            <a:r>
+              <a:rPr lang="en-US" dirty="0" err="1"/>
+              <a:t>gRPC</a:t>
+            </a:r>
+            <a:r>
+              <a:rPr lang="en-US" dirty="0"/>
+              <a:t> bits RTM for ages; all other bits now RTM with .NET Core 3</a:t>
             </a:r>
           </a:p>
           <a:p>
@@ -17007,10 +17015,9 @@
               <a:buNone/>
             </a:pPr>
             <a:r>
-              <a:rPr lang="en-US"/>
+              <a:rPr lang="en-US" dirty="0"/>
               <a:t>.</a:t>
             </a:r>
-            <a:endParaRPr lang="en-US" dirty="0"/>
           </a:p>
           <a:p>
             <a:pPr marL="0" indent="0">
@@ -17888,6 +17895,210 @@
           </a:p>
         </p:txBody>
       </p:sp>
+      <p:sp>
+        <p:nvSpPr>
+          <p:cNvPr id="8" name="Content Placeholder 2">
+            <a:extLst>
+              <a:ext uri="{FF2B5EF4-FFF2-40B4-BE49-F238E27FC236}">
+                <a16:creationId xmlns:a16="http://schemas.microsoft.com/office/drawing/2014/main" id="{92579687-9E6E-474A-B939-063F0554FC3D}"/>
+              </a:ext>
+            </a:extLst>
+          </p:cNvPr>
+          <p:cNvSpPr txBox="1">
+            <a:spLocks/>
+          </p:cNvSpPr>
+          <p:nvPr/>
+        </p:nvSpPr>
+        <p:spPr>
+          <a:xfrm>
+            <a:off x="1467967" y="2524560"/>
+            <a:ext cx="9681116" cy="4080533"/>
+          </a:xfrm>
+          <a:prstGeom prst="rect">
+            <a:avLst/>
+          </a:prstGeom>
+        </p:spPr>
+        <p:txBody>
+          <a:bodyPr vert="horz" lIns="91440" tIns="45720" rIns="91440" bIns="45720" rtlCol="0" anchor="ctr">
+            <a:normAutofit/>
+          </a:bodyPr>
+          <a:lstStyle>
+            <a:lvl1pPr marL="228600" indent="-228600" algn="l" defTabSz="914400" rtl="0" eaLnBrk="1" latinLnBrk="0" hangingPunct="1">
+              <a:lnSpc>
+                <a:spcPct val="90000"/>
+              </a:lnSpc>
+              <a:spcBef>
+                <a:spcPts val="1000"/>
+              </a:spcBef>
+              <a:buFont typeface="Arial" panose="020B0604020202020204" pitchFamily="34" charset="0"/>
+              <a:buChar char="•"/>
+              <a:defRPr sz="2800" kern="1200">
+                <a:solidFill>
+                  <a:schemeClr val="tx1"/>
+                </a:solidFill>
+                <a:latin typeface="+mn-lt"/>
+                <a:ea typeface="+mn-ea"/>
+                <a:cs typeface="+mn-cs"/>
+              </a:defRPr>
+            </a:lvl1pPr>
+            <a:lvl2pPr marL="685800" indent="-228600" algn="l" defTabSz="914400" rtl="0" eaLnBrk="1" latinLnBrk="0" hangingPunct="1">
+              <a:lnSpc>
+                <a:spcPct val="90000"/>
+              </a:lnSpc>
+              <a:spcBef>
+                <a:spcPts val="500"/>
+              </a:spcBef>
+              <a:buFont typeface="Arial" panose="020B0604020202020204" pitchFamily="34" charset="0"/>
+              <a:buChar char="•"/>
+              <a:defRPr sz="2400" kern="1200">
+                <a:solidFill>
+                  <a:schemeClr val="tx1"/>
+                </a:solidFill>
+                <a:latin typeface="+mn-lt"/>
+                <a:ea typeface="+mn-ea"/>
+                <a:cs typeface="+mn-cs"/>
+              </a:defRPr>
+            </a:lvl2pPr>
+            <a:lvl3pPr marL="1143000" indent="-228600" algn="l" defTabSz="914400" rtl="0" eaLnBrk="1" latinLnBrk="0" hangingPunct="1">
+              <a:lnSpc>
+                <a:spcPct val="90000"/>
+              </a:lnSpc>
+              <a:spcBef>
+                <a:spcPts val="500"/>
+              </a:spcBef>
+              <a:buFont typeface="Arial" panose="020B0604020202020204" pitchFamily="34" charset="0"/>
+              <a:buChar char="•"/>
+              <a:defRPr sz="2000" kern="1200">
+                <a:solidFill>
+                  <a:schemeClr val="tx1"/>
+                </a:solidFill>
+                <a:latin typeface="+mn-lt"/>
+                <a:ea typeface="+mn-ea"/>
+                <a:cs typeface="+mn-cs"/>
+              </a:defRPr>
+            </a:lvl3pPr>
+            <a:lvl4pPr marL="1600200" indent="-228600" algn="l" defTabSz="914400" rtl="0" eaLnBrk="1" latinLnBrk="0" hangingPunct="1">
+              <a:lnSpc>
+                <a:spcPct val="90000"/>
+              </a:lnSpc>
+              <a:spcBef>
+                <a:spcPts val="500"/>
+              </a:spcBef>
+              <a:buFont typeface="Arial" panose="020B0604020202020204" pitchFamily="34" charset="0"/>
+              <a:buChar char="•"/>
+              <a:defRPr sz="1800" kern="1200">
+                <a:solidFill>
+                  <a:schemeClr val="tx1"/>
+                </a:solidFill>
+                <a:latin typeface="+mn-lt"/>
+                <a:ea typeface="+mn-ea"/>
+                <a:cs typeface="+mn-cs"/>
+              </a:defRPr>
+            </a:lvl4pPr>
+            <a:lvl5pPr marL="2057400" indent="-228600" algn="l" defTabSz="914400" rtl="0" eaLnBrk="1" latinLnBrk="0" hangingPunct="1">
+              <a:lnSpc>
+                <a:spcPct val="90000"/>
+              </a:lnSpc>
+              <a:spcBef>
+                <a:spcPts val="500"/>
+              </a:spcBef>
+              <a:buFont typeface="Arial" panose="020B0604020202020204" pitchFamily="34" charset="0"/>
+              <a:buChar char="•"/>
+              <a:defRPr sz="1800" kern="1200">
+                <a:solidFill>
+                  <a:schemeClr val="tx1"/>
+                </a:solidFill>
+                <a:latin typeface="+mn-lt"/>
+                <a:ea typeface="+mn-ea"/>
+                <a:cs typeface="+mn-cs"/>
+              </a:defRPr>
+            </a:lvl5pPr>
+            <a:lvl6pPr marL="2514600" indent="-228600" algn="l" defTabSz="914400" rtl="0" eaLnBrk="1" latinLnBrk="0" hangingPunct="1">
+              <a:lnSpc>
+                <a:spcPct val="90000"/>
+              </a:lnSpc>
+              <a:spcBef>
+                <a:spcPts val="500"/>
+              </a:spcBef>
+              <a:buFont typeface="Arial" panose="020B0604020202020204" pitchFamily="34" charset="0"/>
+              <a:buChar char="•"/>
+              <a:defRPr sz="1800" kern="1200">
+                <a:solidFill>
+                  <a:schemeClr val="tx1"/>
+                </a:solidFill>
+                <a:latin typeface="+mn-lt"/>
+                <a:ea typeface="+mn-ea"/>
+                <a:cs typeface="+mn-cs"/>
+              </a:defRPr>
+            </a:lvl6pPr>
+            <a:lvl7pPr marL="2971800" indent="-228600" algn="l" defTabSz="914400" rtl="0" eaLnBrk="1" latinLnBrk="0" hangingPunct="1">
+              <a:lnSpc>
+                <a:spcPct val="90000"/>
+              </a:lnSpc>
+              <a:spcBef>
+                <a:spcPts val="500"/>
+              </a:spcBef>
+              <a:buFont typeface="Arial" panose="020B0604020202020204" pitchFamily="34" charset="0"/>
+              <a:buChar char="•"/>
+              <a:defRPr sz="1800" kern="1200">
+                <a:solidFill>
+                  <a:schemeClr val="tx1"/>
+                </a:solidFill>
+                <a:latin typeface="+mn-lt"/>
+                <a:ea typeface="+mn-ea"/>
+                <a:cs typeface="+mn-cs"/>
+              </a:defRPr>
+            </a:lvl7pPr>
+            <a:lvl8pPr marL="3429000" indent="-228600" algn="l" defTabSz="914400" rtl="0" eaLnBrk="1" latinLnBrk="0" hangingPunct="1">
+              <a:lnSpc>
+                <a:spcPct val="90000"/>
+              </a:lnSpc>
+              <a:spcBef>
+                <a:spcPts val="500"/>
+              </a:spcBef>
+              <a:buFont typeface="Arial" panose="020B0604020202020204" pitchFamily="34" charset="0"/>
+              <a:buChar char="•"/>
+              <a:defRPr sz="1800" kern="1200">
+                <a:solidFill>
+                  <a:schemeClr val="tx1"/>
+                </a:solidFill>
+                <a:latin typeface="+mn-lt"/>
+                <a:ea typeface="+mn-ea"/>
+                <a:cs typeface="+mn-cs"/>
+              </a:defRPr>
+            </a:lvl8pPr>
+            <a:lvl9pPr marL="3886200" indent="-228600" algn="l" defTabSz="914400" rtl="0" eaLnBrk="1" latinLnBrk="0" hangingPunct="1">
+              <a:lnSpc>
+                <a:spcPct val="90000"/>
+              </a:lnSpc>
+              <a:spcBef>
+                <a:spcPts val="500"/>
+              </a:spcBef>
+              <a:buFont typeface="Arial" panose="020B0604020202020204" pitchFamily="34" charset="0"/>
+              <a:buChar char="•"/>
+              <a:defRPr sz="1800" kern="1200">
+                <a:solidFill>
+                  <a:schemeClr val="tx1"/>
+                </a:solidFill>
+                <a:latin typeface="+mn-lt"/>
+                <a:ea typeface="+mn-ea"/>
+                <a:cs typeface="+mn-cs"/>
+              </a:defRPr>
+            </a:lvl9pPr>
+          </a:lstStyle>
+          <a:p>
+            <a:pPr marL="0" indent="0" algn="ctr">
+              <a:buFont typeface="Arial" panose="020B0604020202020204" pitchFamily="34" charset="0"/>
+              <a:buNone/>
+            </a:pPr>
+            <a:r>
+              <a:rPr lang="en-US" sz="3200" dirty="0"/>
+              <a:t>(and questions?)</a:t>
+            </a:r>
+            <a:endParaRPr lang="en-GB" sz="3200" dirty="0"/>
+          </a:p>
+        </p:txBody>
+      </p:sp>
     </p:spTree>
     <p:extLst>
       <p:ext uri="{BB962C8B-B14F-4D97-AF65-F5344CB8AC3E}">
@@ -18785,7 +18996,7 @@
         <p:spPr/>
         <p:txBody>
           <a:bodyPr>
-            <a:normAutofit fontScale="85000" lnSpcReduction="20000"/>
+            <a:normAutofit fontScale="70000" lnSpcReduction="20000"/>
           </a:bodyPr>
           <a:lstStyle/>
           <a:p>
@@ -18844,6 +19055,12 @@
             <a:r>
               <a:rPr lang="en-US" dirty="0"/>
               <a:t>A good choice for your own systems if you want efficient, robust, well-designed/implemented/tested, cross-platform RPC!</a:t>
+            </a:r>
+          </a:p>
+          <a:p>
+            <a:r>
+              <a:rPr lang="en-US" dirty="0"/>
+              <a:t>Great for micro-services!</a:t>
             </a:r>
           </a:p>
           <a:p>
@@ -19290,7 +19507,7 @@
                                         <p:tgtEl>
                                           <p:spTgt spid="3">
                                             <p:txEl>
-                                              <p:pRg st="8" end="8"/>
+                                              <p:pRg st="7" end="7"/>
                                             </p:txEl>
                                           </p:spTgt>
                                         </p:tgtEl>
@@ -19340,6 +19557,55 @@
                                           <p:spTgt spid="3">
                                             <p:txEl>
                                               <p:pRg st="9" end="9"/>
+                                            </p:txEl>
+                                          </p:spTgt>
+                                        </p:tgtEl>
+                                        <p:attrNameLst>
+                                          <p:attrName>style.visibility</p:attrName>
+                                        </p:attrNameLst>
+                                      </p:cBhvr>
+                                      <p:to>
+                                        <p:strVal val="visible"/>
+                                      </p:to>
+                                    </p:set>
+                                  </p:childTnLst>
+                                </p:cTn>
+                              </p:par>
+                            </p:childTnLst>
+                          </p:cTn>
+                        </p:par>
+                      </p:childTnLst>
+                    </p:cTn>
+                  </p:par>
+                  <p:par>
+                    <p:cTn id="39" fill="hold">
+                      <p:stCondLst>
+                        <p:cond delay="indefinite"/>
+                      </p:stCondLst>
+                      <p:childTnLst>
+                        <p:par>
+                          <p:cTn id="40" fill="hold">
+                            <p:stCondLst>
+                              <p:cond delay="0"/>
+                            </p:stCondLst>
+                            <p:childTnLst>
+                              <p:par>
+                                <p:cTn id="41" presetID="1" presetClass="entr" presetSubtype="0" fill="hold" grpId="0" nodeType="clickEffect">
+                                  <p:stCondLst>
+                                    <p:cond delay="0"/>
+                                  </p:stCondLst>
+                                  <p:childTnLst>
+                                    <p:set>
+                                      <p:cBhvr>
+                                        <p:cTn id="42" dur="1" fill="hold">
+                                          <p:stCondLst>
+                                            <p:cond delay="0"/>
+                                          </p:stCondLst>
+                                        </p:cTn>
+                                        <p:tgtEl>
+                                          <p:spTgt spid="3">
+                                            <p:txEl>
+                                              <p:pRg st="10" end="10"/>
                                             </p:txEl>
                                           </p:spTgt>
                                         </p:tgtEl>

</xml_diff>